<commit_message>
commit interfacce tolte e rifatte
</commit_message>
<xml_diff>
--- a/RASD/The world and the machine.pptx
+++ b/RASD/The world and the machine.pptx
@@ -104,6 +104,11 @@
       </a:defRPr>
     </a:lvl9pPr>
   </p:defaultTextStyle>
+  <p:extLst>
+    <p:ext uri="{EFAFB233-063F-42B5-8137-9DF3F51BA10A}">
+      <p15:sldGuideLst xmlns:p15="http://schemas.microsoft.com/office/powerpoint/2012/main"/>
+    </p:ext>
+  </p:extLst>
 </p:presentation>
 </file>
 
@@ -238,7 +243,7 @@
           <a:p>
             <a:fld id="{77C540BA-C838-4A57-844A-622CF50BAFD4}" type="datetimeFigureOut">
               <a:rPr lang="it-IT" smtClean="0"/>
-              <a:t>29/10/2015</a:t>
+              <a:t>31/10/2015</a:t>
             </a:fld>
             <a:endParaRPr lang="it-IT"/>
           </a:p>
@@ -408,7 +413,7 @@
           <a:p>
             <a:fld id="{77C540BA-C838-4A57-844A-622CF50BAFD4}" type="datetimeFigureOut">
               <a:rPr lang="it-IT" smtClean="0"/>
-              <a:t>29/10/2015</a:t>
+              <a:t>31/10/2015</a:t>
             </a:fld>
             <a:endParaRPr lang="it-IT"/>
           </a:p>
@@ -588,7 +593,7 @@
           <a:p>
             <a:fld id="{77C540BA-C838-4A57-844A-622CF50BAFD4}" type="datetimeFigureOut">
               <a:rPr lang="it-IT" smtClean="0"/>
-              <a:t>29/10/2015</a:t>
+              <a:t>31/10/2015</a:t>
             </a:fld>
             <a:endParaRPr lang="it-IT"/>
           </a:p>
@@ -758,7 +763,7 @@
           <a:p>
             <a:fld id="{77C540BA-C838-4A57-844A-622CF50BAFD4}" type="datetimeFigureOut">
               <a:rPr lang="it-IT" smtClean="0"/>
-              <a:t>29/10/2015</a:t>
+              <a:t>31/10/2015</a:t>
             </a:fld>
             <a:endParaRPr lang="it-IT"/>
           </a:p>
@@ -1004,7 +1009,7 @@
           <a:p>
             <a:fld id="{77C540BA-C838-4A57-844A-622CF50BAFD4}" type="datetimeFigureOut">
               <a:rPr lang="it-IT" smtClean="0"/>
-              <a:t>29/10/2015</a:t>
+              <a:t>31/10/2015</a:t>
             </a:fld>
             <a:endParaRPr lang="it-IT"/>
           </a:p>
@@ -1236,7 +1241,7 @@
           <a:p>
             <a:fld id="{77C540BA-C838-4A57-844A-622CF50BAFD4}" type="datetimeFigureOut">
               <a:rPr lang="it-IT" smtClean="0"/>
-              <a:t>29/10/2015</a:t>
+              <a:t>31/10/2015</a:t>
             </a:fld>
             <a:endParaRPr lang="it-IT"/>
           </a:p>
@@ -1603,7 +1608,7 @@
           <a:p>
             <a:fld id="{77C540BA-C838-4A57-844A-622CF50BAFD4}" type="datetimeFigureOut">
               <a:rPr lang="it-IT" smtClean="0"/>
-              <a:t>29/10/2015</a:t>
+              <a:t>31/10/2015</a:t>
             </a:fld>
             <a:endParaRPr lang="it-IT"/>
           </a:p>
@@ -1721,7 +1726,7 @@
           <a:p>
             <a:fld id="{77C540BA-C838-4A57-844A-622CF50BAFD4}" type="datetimeFigureOut">
               <a:rPr lang="it-IT" smtClean="0"/>
-              <a:t>29/10/2015</a:t>
+              <a:t>31/10/2015</a:t>
             </a:fld>
             <a:endParaRPr lang="it-IT"/>
           </a:p>
@@ -1816,7 +1821,7 @@
           <a:p>
             <a:fld id="{77C540BA-C838-4A57-844A-622CF50BAFD4}" type="datetimeFigureOut">
               <a:rPr lang="it-IT" smtClean="0"/>
-              <a:t>29/10/2015</a:t>
+              <a:t>31/10/2015</a:t>
             </a:fld>
             <a:endParaRPr lang="it-IT"/>
           </a:p>
@@ -2093,7 +2098,7 @@
           <a:p>
             <a:fld id="{77C540BA-C838-4A57-844A-622CF50BAFD4}" type="datetimeFigureOut">
               <a:rPr lang="it-IT" smtClean="0"/>
-              <a:t>29/10/2015</a:t>
+              <a:t>31/10/2015</a:t>
             </a:fld>
             <a:endParaRPr lang="it-IT"/>
           </a:p>
@@ -2346,7 +2351,7 @@
           <a:p>
             <a:fld id="{77C540BA-C838-4A57-844A-622CF50BAFD4}" type="datetimeFigureOut">
               <a:rPr lang="it-IT" smtClean="0"/>
-              <a:t>29/10/2015</a:t>
+              <a:t>31/10/2015</a:t>
             </a:fld>
             <a:endParaRPr lang="it-IT"/>
           </a:p>
@@ -2559,7 +2564,7 @@
           <a:p>
             <a:fld id="{77C540BA-C838-4A57-844A-622CF50BAFD4}" type="datetimeFigureOut">
               <a:rPr lang="it-IT" smtClean="0"/>
-              <a:t>29/10/2015</a:t>
+              <a:t>31/10/2015</a:t>
             </a:fld>
             <a:endParaRPr lang="it-IT"/>
           </a:p>
@@ -3356,7 +3361,7 @@
         </p:nvSpPr>
         <p:spPr>
           <a:xfrm>
-            <a:off x="4206948" y="3179653"/>
+            <a:off x="3928726" y="3022424"/>
             <a:ext cx="1729563" cy="461665"/>
           </a:xfrm>
           <a:prstGeom prst="rect">
@@ -3406,7 +3411,7 @@
         </p:nvSpPr>
         <p:spPr>
           <a:xfrm>
-            <a:off x="4455042" y="2651628"/>
+            <a:off x="4253021" y="2466962"/>
             <a:ext cx="1729563" cy="461665"/>
           </a:xfrm>
           <a:prstGeom prst="rect">
@@ -3439,6 +3444,144 @@
             <a:r>
               <a:rPr lang="it-IT" sz="1200" dirty="0" err="1" smtClean="0"/>
               <a:t>reservation</a:t>
+            </a:r>
+            <a:endParaRPr lang="it-IT" sz="1200" dirty="0"/>
+          </a:p>
+        </p:txBody>
+      </p:sp>
+      <p:sp>
+        <p:nvSpPr>
+          <p:cNvPr id="16" name="CasellaDiTesto 15"/>
+          <p:cNvSpPr txBox="1"/>
+          <p:nvPr/>
+        </p:nvSpPr>
+        <p:spPr>
+          <a:xfrm>
+            <a:off x="1070343" y="3016559"/>
+            <a:ext cx="1729563" cy="646331"/>
+          </a:xfrm>
+          <a:prstGeom prst="rect">
+            <a:avLst/>
+          </a:prstGeom>
+          <a:noFill/>
+        </p:spPr>
+        <p:txBody>
+          <a:bodyPr wrap="square" rtlCol="0">
+            <a:spAutoFit/>
+          </a:bodyPr>
+          <a:lstStyle/>
+          <a:p>
+            <a:r>
+              <a:rPr lang="it-IT" sz="1200" dirty="0" smtClean="0"/>
+              <a:t>Taxi </a:t>
+            </a:r>
+            <a:r>
+              <a:rPr lang="it-IT" sz="1200" dirty="0" smtClean="0"/>
+              <a:t>driver </a:t>
+            </a:r>
+            <a:r>
+              <a:rPr lang="it-IT" sz="1200" dirty="0" err="1" smtClean="0"/>
+              <a:t>asks</a:t>
+            </a:r>
+            <a:r>
+              <a:rPr lang="it-IT" sz="1200" dirty="0" smtClean="0"/>
+              <a:t> the </a:t>
+            </a:r>
+            <a:r>
+              <a:rPr lang="it-IT" sz="1200" dirty="0" err="1" smtClean="0"/>
+              <a:t>admin</a:t>
+            </a:r>
+            <a:r>
+              <a:rPr lang="it-IT" sz="1200" dirty="0" smtClean="0"/>
+              <a:t> to be </a:t>
+            </a:r>
+            <a:r>
+              <a:rPr lang="it-IT" sz="1200" dirty="0" err="1" smtClean="0"/>
+              <a:t>inserted</a:t>
+            </a:r>
+            <a:r>
+              <a:rPr lang="it-IT" sz="1200" dirty="0" smtClean="0"/>
+              <a:t> </a:t>
+            </a:r>
+            <a:r>
+              <a:rPr lang="it-IT" sz="1200" dirty="0" err="1" smtClean="0"/>
+              <a:t>into</a:t>
+            </a:r>
+            <a:r>
+              <a:rPr lang="it-IT" sz="1200" dirty="0" smtClean="0"/>
+              <a:t> the database</a:t>
+            </a:r>
+            <a:endParaRPr lang="it-IT" sz="1200" dirty="0"/>
+          </a:p>
+        </p:txBody>
+      </p:sp>
+      <p:sp>
+        <p:nvSpPr>
+          <p:cNvPr id="17" name="CasellaDiTesto 16"/>
+          <p:cNvSpPr txBox="1"/>
+          <p:nvPr/>
+        </p:nvSpPr>
+        <p:spPr>
+          <a:xfrm>
+            <a:off x="6817235" y="3288510"/>
+            <a:ext cx="1729563" cy="276999"/>
+          </a:xfrm>
+          <a:prstGeom prst="rect">
+            <a:avLst/>
+          </a:prstGeom>
+          <a:noFill/>
+        </p:spPr>
+        <p:txBody>
+          <a:bodyPr wrap="square" rtlCol="0">
+            <a:spAutoFit/>
+          </a:bodyPr>
+          <a:lstStyle/>
+          <a:p>
+            <a:r>
+              <a:rPr lang="it-IT" sz="1200" dirty="0" err="1" smtClean="0"/>
+              <a:t>Queues</a:t>
+            </a:r>
+            <a:r>
+              <a:rPr lang="it-IT" sz="1200" dirty="0" smtClean="0"/>
+              <a:t> </a:t>
+            </a:r>
+            <a:r>
+              <a:rPr lang="it-IT" sz="1200" dirty="0" err="1" smtClean="0"/>
+              <a:t>computation</a:t>
+            </a:r>
+            <a:endParaRPr lang="it-IT" sz="1200" dirty="0"/>
+          </a:p>
+        </p:txBody>
+      </p:sp>
+      <p:sp>
+        <p:nvSpPr>
+          <p:cNvPr id="18" name="CasellaDiTesto 17"/>
+          <p:cNvSpPr txBox="1"/>
+          <p:nvPr/>
+        </p:nvSpPr>
+        <p:spPr>
+          <a:xfrm>
+            <a:off x="3785189" y="3563709"/>
+            <a:ext cx="1729563" cy="461665"/>
+          </a:xfrm>
+          <a:prstGeom prst="rect">
+            <a:avLst/>
+          </a:prstGeom>
+          <a:noFill/>
+        </p:spPr>
+        <p:txBody>
+          <a:bodyPr wrap="square" rtlCol="0">
+            <a:spAutoFit/>
+          </a:bodyPr>
+          <a:lstStyle/>
+          <a:p>
+            <a:r>
+              <a:rPr lang="it-IT" sz="1200" dirty="0" err="1" smtClean="0"/>
+              <a:t>Change</a:t>
+            </a:r>
+            <a:r>
+              <a:rPr lang="it-IT" sz="1200" dirty="0" smtClean="0"/>
+              <a:t> of a taxi driver state</a:t>
             </a:r>
             <a:endParaRPr lang="it-IT" sz="1200" dirty="0"/>
           </a:p>

</xml_diff>

<commit_message>
aggiunta the world and the machine e use case definitivo
</commit_message>
<xml_diff>
--- a/RASD/The world and the machine.pptx
+++ b/RASD/The world and the machine.pptx
@@ -243,7 +243,7 @@
           <a:p>
             <a:fld id="{77C540BA-C838-4A57-844A-622CF50BAFD4}" type="datetimeFigureOut">
               <a:rPr lang="it-IT" smtClean="0"/>
-              <a:t>31/10/2015</a:t>
+              <a:t>05/11/2015</a:t>
             </a:fld>
             <a:endParaRPr lang="it-IT"/>
           </a:p>
@@ -413,7 +413,7 @@
           <a:p>
             <a:fld id="{77C540BA-C838-4A57-844A-622CF50BAFD4}" type="datetimeFigureOut">
               <a:rPr lang="it-IT" smtClean="0"/>
-              <a:t>31/10/2015</a:t>
+              <a:t>05/11/2015</a:t>
             </a:fld>
             <a:endParaRPr lang="it-IT"/>
           </a:p>
@@ -593,7 +593,7 @@
           <a:p>
             <a:fld id="{77C540BA-C838-4A57-844A-622CF50BAFD4}" type="datetimeFigureOut">
               <a:rPr lang="it-IT" smtClean="0"/>
-              <a:t>31/10/2015</a:t>
+              <a:t>05/11/2015</a:t>
             </a:fld>
             <a:endParaRPr lang="it-IT"/>
           </a:p>
@@ -763,7 +763,7 @@
           <a:p>
             <a:fld id="{77C540BA-C838-4A57-844A-622CF50BAFD4}" type="datetimeFigureOut">
               <a:rPr lang="it-IT" smtClean="0"/>
-              <a:t>31/10/2015</a:t>
+              <a:t>05/11/2015</a:t>
             </a:fld>
             <a:endParaRPr lang="it-IT"/>
           </a:p>
@@ -1009,7 +1009,7 @@
           <a:p>
             <a:fld id="{77C540BA-C838-4A57-844A-622CF50BAFD4}" type="datetimeFigureOut">
               <a:rPr lang="it-IT" smtClean="0"/>
-              <a:t>31/10/2015</a:t>
+              <a:t>05/11/2015</a:t>
             </a:fld>
             <a:endParaRPr lang="it-IT"/>
           </a:p>
@@ -1241,7 +1241,7 @@
           <a:p>
             <a:fld id="{77C540BA-C838-4A57-844A-622CF50BAFD4}" type="datetimeFigureOut">
               <a:rPr lang="it-IT" smtClean="0"/>
-              <a:t>31/10/2015</a:t>
+              <a:t>05/11/2015</a:t>
             </a:fld>
             <a:endParaRPr lang="it-IT"/>
           </a:p>
@@ -1608,7 +1608,7 @@
           <a:p>
             <a:fld id="{77C540BA-C838-4A57-844A-622CF50BAFD4}" type="datetimeFigureOut">
               <a:rPr lang="it-IT" smtClean="0"/>
-              <a:t>31/10/2015</a:t>
+              <a:t>05/11/2015</a:t>
             </a:fld>
             <a:endParaRPr lang="it-IT"/>
           </a:p>
@@ -1726,7 +1726,7 @@
           <a:p>
             <a:fld id="{77C540BA-C838-4A57-844A-622CF50BAFD4}" type="datetimeFigureOut">
               <a:rPr lang="it-IT" smtClean="0"/>
-              <a:t>31/10/2015</a:t>
+              <a:t>05/11/2015</a:t>
             </a:fld>
             <a:endParaRPr lang="it-IT"/>
           </a:p>
@@ -1821,7 +1821,7 @@
           <a:p>
             <a:fld id="{77C540BA-C838-4A57-844A-622CF50BAFD4}" type="datetimeFigureOut">
               <a:rPr lang="it-IT" smtClean="0"/>
-              <a:t>31/10/2015</a:t>
+              <a:t>05/11/2015</a:t>
             </a:fld>
             <a:endParaRPr lang="it-IT"/>
           </a:p>
@@ -2098,7 +2098,7 @@
           <a:p>
             <a:fld id="{77C540BA-C838-4A57-844A-622CF50BAFD4}" type="datetimeFigureOut">
               <a:rPr lang="it-IT" smtClean="0"/>
-              <a:t>31/10/2015</a:t>
+              <a:t>05/11/2015</a:t>
             </a:fld>
             <a:endParaRPr lang="it-IT"/>
           </a:p>
@@ -2351,7 +2351,7 @@
           <a:p>
             <a:fld id="{77C540BA-C838-4A57-844A-622CF50BAFD4}" type="datetimeFigureOut">
               <a:rPr lang="it-IT" smtClean="0"/>
-              <a:t>31/10/2015</a:t>
+              <a:t>05/11/2015</a:t>
             </a:fld>
             <a:endParaRPr lang="it-IT"/>
           </a:p>
@@ -2564,7 +2564,7 @@
           <a:p>
             <a:fld id="{77C540BA-C838-4A57-844A-622CF50BAFD4}" type="datetimeFigureOut">
               <a:rPr lang="it-IT" smtClean="0"/>
-              <a:t>31/10/2015</a:t>
+              <a:t>05/11/2015</a:t>
             </a:fld>
             <a:endParaRPr lang="it-IT"/>
           </a:p>
@@ -3006,7 +3006,7 @@
         <p:spPr>
           <a:xfrm>
             <a:off x="744279" y="1807535"/>
-            <a:ext cx="5883349" cy="3756837"/>
+            <a:ext cx="6657744" cy="3756837"/>
           </a:xfrm>
           <a:prstGeom prst="ellipse">
             <a:avLst/>
@@ -3046,8 +3046,8 @@
         </p:nvSpPr>
         <p:spPr>
           <a:xfrm>
-            <a:off x="3561910" y="1860697"/>
-            <a:ext cx="5883349" cy="3756837"/>
+            <a:off x="2565992" y="1860697"/>
+            <a:ext cx="6879268" cy="3756837"/>
           </a:xfrm>
           <a:prstGeom prst="ellipse">
             <a:avLst/>
@@ -3221,7 +3221,7 @@
         </p:nvSpPr>
         <p:spPr>
           <a:xfrm>
-            <a:off x="6794201" y="2917962"/>
+            <a:off x="7756448" y="2954001"/>
             <a:ext cx="1729563" cy="276999"/>
           </a:xfrm>
           <a:prstGeom prst="rect">
@@ -3255,7 +3255,7 @@
         </p:nvSpPr>
         <p:spPr>
           <a:xfrm>
-            <a:off x="6627630" y="2547414"/>
+            <a:off x="7258495" y="2596579"/>
             <a:ext cx="1729563" cy="276999"/>
           </a:xfrm>
           <a:prstGeom prst="rect">
@@ -3289,7 +3289,7 @@
         </p:nvSpPr>
         <p:spPr>
           <a:xfrm>
-            <a:off x="6305107" y="2297091"/>
+            <a:off x="6817234" y="2289119"/>
             <a:ext cx="1729563" cy="276999"/>
           </a:xfrm>
           <a:prstGeom prst="rect">
@@ -3347,7 +3347,11 @@
             </a:r>
             <a:r>
               <a:rPr lang="it-IT" sz="1200" dirty="0" smtClean="0"/>
-              <a:t> up client</a:t>
+              <a:t> up </a:t>
+            </a:r>
+            <a:r>
+              <a:rPr lang="it-IT" sz="1200" dirty="0" err="1" smtClean="0"/>
+              <a:t>user</a:t>
             </a:r>
             <a:endParaRPr lang="it-IT" sz="1200" dirty="0"/>
           </a:p>
@@ -3361,7 +3365,7 @@
         </p:nvSpPr>
         <p:spPr>
           <a:xfrm>
-            <a:off x="3928726" y="3022424"/>
+            <a:off x="3125970" y="2696933"/>
             <a:ext cx="1729563" cy="461665"/>
           </a:xfrm>
           <a:prstGeom prst="rect">
@@ -3411,7 +3415,7 @@
         </p:nvSpPr>
         <p:spPr>
           <a:xfrm>
-            <a:off x="4253021" y="2466962"/>
+            <a:off x="3928725" y="2230470"/>
             <a:ext cx="1729563" cy="461665"/>
           </a:xfrm>
           <a:prstGeom prst="rect">
@@ -3473,11 +3477,7 @@
           <a:p>
             <a:r>
               <a:rPr lang="it-IT" sz="1200" dirty="0" smtClean="0"/>
-              <a:t>Taxi </a:t>
-            </a:r>
-            <a:r>
-              <a:rPr lang="it-IT" sz="1200" dirty="0" smtClean="0"/>
-              <a:t>driver </a:t>
+              <a:t>Taxi driver </a:t>
             </a:r>
             <a:r>
               <a:rPr lang="it-IT" sz="1200" dirty="0" err="1" smtClean="0"/>
@@ -3523,7 +3523,7 @@
         </p:nvSpPr>
         <p:spPr>
           <a:xfrm>
-            <a:off x="6817235" y="3288510"/>
+            <a:off x="7717466" y="3290292"/>
             <a:ext cx="1729563" cy="276999"/>
           </a:xfrm>
           <a:prstGeom prst="rect">
@@ -3561,7 +3561,7 @@
         </p:nvSpPr>
         <p:spPr>
           <a:xfrm>
-            <a:off x="3785189" y="3563709"/>
+            <a:off x="2821171" y="3263778"/>
             <a:ext cx="1729563" cy="461665"/>
           </a:xfrm>
           <a:prstGeom prst="rect">
@@ -3584,6 +3584,309 @@
               <a:t> of a taxi driver state</a:t>
             </a:r>
             <a:endParaRPr lang="it-IT" sz="1200" dirty="0"/>
+          </a:p>
+        </p:txBody>
+      </p:sp>
+      <p:sp>
+        <p:nvSpPr>
+          <p:cNvPr id="19" name="CasellaDiTesto 18"/>
+          <p:cNvSpPr txBox="1"/>
+          <p:nvPr/>
+        </p:nvSpPr>
+        <p:spPr>
+          <a:xfrm>
+            <a:off x="1070343" y="3778070"/>
+            <a:ext cx="1729563" cy="276999"/>
+          </a:xfrm>
+          <a:prstGeom prst="rect">
+            <a:avLst/>
+          </a:prstGeom>
+          <a:noFill/>
+        </p:spPr>
+        <p:txBody>
+          <a:bodyPr wrap="square" rtlCol="0">
+            <a:spAutoFit/>
+          </a:bodyPr>
+          <a:lstStyle/>
+          <a:p>
+            <a:r>
+              <a:rPr lang="it-IT" sz="1200" dirty="0" smtClean="0"/>
+              <a:t>User </a:t>
+            </a:r>
+            <a:r>
+              <a:rPr lang="it-IT" sz="1200" dirty="0" err="1" smtClean="0"/>
+              <a:t>needs</a:t>
+            </a:r>
+            <a:r>
+              <a:rPr lang="it-IT" sz="1200" dirty="0" smtClean="0"/>
+              <a:t> a taxi</a:t>
+            </a:r>
+            <a:endParaRPr lang="it-IT" sz="1200" dirty="0"/>
+          </a:p>
+        </p:txBody>
+      </p:sp>
+      <p:sp>
+        <p:nvSpPr>
+          <p:cNvPr id="20" name="CasellaDiTesto 19"/>
+          <p:cNvSpPr txBox="1"/>
+          <p:nvPr/>
+        </p:nvSpPr>
+        <p:spPr>
+          <a:xfrm>
+            <a:off x="2821171" y="3778070"/>
+            <a:ext cx="1729563" cy="646331"/>
+          </a:xfrm>
+          <a:prstGeom prst="rect">
+            <a:avLst/>
+          </a:prstGeom>
+          <a:noFill/>
+        </p:spPr>
+        <p:txBody>
+          <a:bodyPr wrap="square" rtlCol="0">
+            <a:spAutoFit/>
+          </a:bodyPr>
+          <a:lstStyle/>
+          <a:p>
+            <a:r>
+              <a:rPr lang="it-IT" sz="1200" dirty="0" smtClean="0"/>
+              <a:t>Notification of a </a:t>
+            </a:r>
+            <a:r>
+              <a:rPr lang="it-IT" sz="1200" dirty="0" err="1" smtClean="0"/>
+              <a:t>user</a:t>
+            </a:r>
+            <a:r>
+              <a:rPr lang="it-IT" sz="1200" dirty="0" smtClean="0"/>
+              <a:t> of the taxi code and ETA of the </a:t>
+            </a:r>
+            <a:r>
+              <a:rPr lang="it-IT" sz="1200" dirty="0" err="1" smtClean="0"/>
+              <a:t>incoming</a:t>
+            </a:r>
+            <a:r>
+              <a:rPr lang="it-IT" sz="1200" dirty="0" smtClean="0"/>
+              <a:t> taxi</a:t>
+            </a:r>
+          </a:p>
+        </p:txBody>
+      </p:sp>
+      <p:sp>
+        <p:nvSpPr>
+          <p:cNvPr id="21" name="CasellaDiTesto 20"/>
+          <p:cNvSpPr txBox="1"/>
+          <p:nvPr/>
+        </p:nvSpPr>
+        <p:spPr>
+          <a:xfrm>
+            <a:off x="7584559" y="3648258"/>
+            <a:ext cx="1729563" cy="276999"/>
+          </a:xfrm>
+          <a:prstGeom prst="rect">
+            <a:avLst/>
+          </a:prstGeom>
+          <a:noFill/>
+        </p:spPr>
+        <p:txBody>
+          <a:bodyPr wrap="square" rtlCol="0">
+            <a:spAutoFit/>
+          </a:bodyPr>
+          <a:lstStyle/>
+          <a:p>
+            <a:r>
+              <a:rPr lang="it-IT" sz="1200" dirty="0"/>
+              <a:t>C</a:t>
+            </a:r>
+            <a:r>
+              <a:rPr lang="it-IT" sz="1200" dirty="0" smtClean="0"/>
+              <a:t>AT </a:t>
+            </a:r>
+            <a:r>
+              <a:rPr lang="it-IT" sz="1200" dirty="0" err="1" smtClean="0"/>
+              <a:t>computation</a:t>
+            </a:r>
+            <a:endParaRPr lang="it-IT" sz="1200" dirty="0"/>
+          </a:p>
+        </p:txBody>
+      </p:sp>
+      <p:sp>
+        <p:nvSpPr>
+          <p:cNvPr id="22" name="CasellaDiTesto 21"/>
+          <p:cNvSpPr txBox="1"/>
+          <p:nvPr/>
+        </p:nvSpPr>
+        <p:spPr>
+          <a:xfrm>
+            <a:off x="7558860" y="4005680"/>
+            <a:ext cx="1729563" cy="461665"/>
+          </a:xfrm>
+          <a:prstGeom prst="rect">
+            <a:avLst/>
+          </a:prstGeom>
+          <a:noFill/>
+        </p:spPr>
+        <p:txBody>
+          <a:bodyPr wrap="square" rtlCol="0">
+            <a:spAutoFit/>
+          </a:bodyPr>
+          <a:lstStyle/>
+          <a:p>
+            <a:r>
+              <a:rPr lang="it-IT" sz="1200" dirty="0" err="1" smtClean="0"/>
+              <a:t>Credentials</a:t>
+            </a:r>
+            <a:r>
+              <a:rPr lang="it-IT" sz="1200" dirty="0" smtClean="0"/>
+              <a:t> </a:t>
+            </a:r>
+            <a:r>
+              <a:rPr lang="it-IT" sz="1200" dirty="0" err="1" smtClean="0"/>
+              <a:t>validation</a:t>
+            </a:r>
+            <a:endParaRPr lang="it-IT" sz="1200" dirty="0" smtClean="0"/>
+          </a:p>
+          <a:p>
+            <a:endParaRPr lang="it-IT" sz="1200" dirty="0"/>
+          </a:p>
+        </p:txBody>
+      </p:sp>
+      <p:sp>
+        <p:nvSpPr>
+          <p:cNvPr id="23" name="CasellaDiTesto 22"/>
+          <p:cNvSpPr txBox="1"/>
+          <p:nvPr/>
+        </p:nvSpPr>
+        <p:spPr>
+          <a:xfrm>
+            <a:off x="5107169" y="2553635"/>
+            <a:ext cx="1729563" cy="461665"/>
+          </a:xfrm>
+          <a:prstGeom prst="rect">
+            <a:avLst/>
+          </a:prstGeom>
+          <a:noFill/>
+        </p:spPr>
+        <p:txBody>
+          <a:bodyPr wrap="square" rtlCol="0">
+            <a:spAutoFit/>
+          </a:bodyPr>
+          <a:lstStyle/>
+          <a:p>
+            <a:r>
+              <a:rPr lang="it-IT" sz="1200" dirty="0" smtClean="0"/>
+              <a:t>Guest </a:t>
+            </a:r>
+            <a:r>
+              <a:rPr lang="it-IT" sz="1200" dirty="0" err="1" smtClean="0"/>
+              <a:t>logs</a:t>
+            </a:r>
+            <a:r>
+              <a:rPr lang="it-IT" sz="1200" dirty="0" smtClean="0"/>
+              <a:t> in</a:t>
+            </a:r>
+          </a:p>
+          <a:p>
+            <a:endParaRPr lang="it-IT" sz="1200" dirty="0"/>
+          </a:p>
+        </p:txBody>
+      </p:sp>
+      <p:sp>
+        <p:nvSpPr>
+          <p:cNvPr id="24" name="CasellaDiTesto 23"/>
+          <p:cNvSpPr txBox="1"/>
+          <p:nvPr/>
+        </p:nvSpPr>
+        <p:spPr>
+          <a:xfrm>
+            <a:off x="5264890" y="2811049"/>
+            <a:ext cx="1729563" cy="646331"/>
+          </a:xfrm>
+          <a:prstGeom prst="rect">
+            <a:avLst/>
+          </a:prstGeom>
+          <a:noFill/>
+        </p:spPr>
+        <p:txBody>
+          <a:bodyPr wrap="square" rtlCol="0">
+            <a:spAutoFit/>
+          </a:bodyPr>
+          <a:lstStyle/>
+          <a:p>
+            <a:r>
+              <a:rPr lang="it-IT" sz="1200" dirty="0" smtClean="0"/>
+              <a:t>User </a:t>
+            </a:r>
+            <a:r>
+              <a:rPr lang="it-IT" sz="1200" dirty="0" err="1" smtClean="0"/>
+              <a:t>logs</a:t>
+            </a:r>
+            <a:r>
+              <a:rPr lang="it-IT" sz="1200" dirty="0" smtClean="0"/>
+              <a:t> out</a:t>
+            </a:r>
+          </a:p>
+          <a:p>
+            <a:endParaRPr lang="it-IT" sz="1200" dirty="0" smtClean="0"/>
+          </a:p>
+          <a:p>
+            <a:endParaRPr lang="it-IT" sz="1200" dirty="0"/>
+          </a:p>
+        </p:txBody>
+      </p:sp>
+      <p:sp>
+        <p:nvSpPr>
+          <p:cNvPr id="25" name="CasellaDiTesto 24"/>
+          <p:cNvSpPr txBox="1"/>
+          <p:nvPr/>
+        </p:nvSpPr>
+        <p:spPr>
+          <a:xfrm>
+            <a:off x="5264890" y="3158598"/>
+            <a:ext cx="1729563" cy="646331"/>
+          </a:xfrm>
+          <a:prstGeom prst="rect">
+            <a:avLst/>
+          </a:prstGeom>
+          <a:noFill/>
+        </p:spPr>
+        <p:txBody>
+          <a:bodyPr wrap="square" rtlCol="0">
+            <a:spAutoFit/>
+          </a:bodyPr>
+          <a:lstStyle/>
+          <a:p>
+            <a:r>
+              <a:rPr lang="it-IT" sz="1200" dirty="0" smtClean="0"/>
+              <a:t>Taxi driver </a:t>
+            </a:r>
+            <a:r>
+              <a:rPr lang="it-IT" sz="1200" dirty="0" err="1" smtClean="0"/>
+              <a:t>accepts</a:t>
+            </a:r>
+            <a:r>
+              <a:rPr lang="it-IT" sz="1200" dirty="0" smtClean="0"/>
+              <a:t> or </a:t>
+            </a:r>
+            <a:r>
+              <a:rPr lang="it-IT" sz="1200" dirty="0" err="1" smtClean="0"/>
+              <a:t>rejects</a:t>
+            </a:r>
+            <a:r>
+              <a:rPr lang="it-IT" sz="1200" dirty="0" smtClean="0"/>
+              <a:t> a </a:t>
+            </a:r>
+            <a:r>
+              <a:rPr lang="it-IT" sz="1200" dirty="0" err="1" smtClean="0"/>
+              <a:t>request</a:t>
+            </a:r>
+            <a:r>
+              <a:rPr lang="it-IT" sz="1200" dirty="0" smtClean="0"/>
+              <a:t> or a </a:t>
+            </a:r>
+            <a:r>
+              <a:rPr lang="it-IT" sz="1200" dirty="0" err="1" smtClean="0"/>
+              <a:t>reservation</a:t>
+            </a:r>
+            <a:endParaRPr lang="it-IT" sz="1200" dirty="0" smtClean="0"/>
           </a:p>
         </p:txBody>
       </p:sp>

</xml_diff>